<commit_message>
C'erano errori nella mia parte diop
</commit_message>
<xml_diff>
--- a/Consegna/Presentazione_progetto_SIIS_Merelli_Carbone_Grosso.pptx
+++ b/Consegna/Presentazione_progetto_SIIS_Merelli_Carbone_Grosso.pptx
@@ -205,7 +205,7 @@
   <pc:docChgLst>
     <pc:chgData name="g.carbone8@campus.unimib.it" userId="b00d38c9-59ca-445d-a206-84026ffe8624" providerId="ADAL" clId="{73B03246-C0D6-48CE-B336-D322CA85AF9C}"/>
     <pc:docChg chg="undo custSel modSld">
-      <pc:chgData name="g.carbone8@campus.unimib.it" userId="b00d38c9-59ca-445d-a206-84026ffe8624" providerId="ADAL" clId="{73B03246-C0D6-48CE-B336-D322CA85AF9C}" dt="2022-01-06T00:09:20.878" v="69" actId="20577"/>
+      <pc:chgData name="g.carbone8@campus.unimib.it" userId="b00d38c9-59ca-445d-a206-84026ffe8624" providerId="ADAL" clId="{73B03246-C0D6-48CE-B336-D322CA85AF9C}" dt="2022-01-06T00:27:29.056" v="107" actId="20577"/>
       <pc:docMkLst>
         <pc:docMk/>
       </pc:docMkLst>
@@ -225,16 +225,31 @@
         </pc:cxnChg>
       </pc:sldChg>
       <pc:sldChg chg="modSp mod">
-        <pc:chgData name="g.carbone8@campus.unimib.it" userId="b00d38c9-59ca-445d-a206-84026ffe8624" providerId="ADAL" clId="{73B03246-C0D6-48CE-B336-D322CA85AF9C}" dt="2022-01-06T00:09:20.878" v="69" actId="20577"/>
+        <pc:chgData name="g.carbone8@campus.unimib.it" userId="b00d38c9-59ca-445d-a206-84026ffe8624" providerId="ADAL" clId="{73B03246-C0D6-48CE-B336-D322CA85AF9C}" dt="2022-01-06T00:21:55.287" v="80" actId="20577"/>
         <pc:sldMkLst>
           <pc:docMk/>
           <pc:sldMk cId="3197017637" sldId="294"/>
         </pc:sldMkLst>
         <pc:spChg chg="mod">
-          <ac:chgData name="g.carbone8@campus.unimib.it" userId="b00d38c9-59ca-445d-a206-84026ffe8624" providerId="ADAL" clId="{73B03246-C0D6-48CE-B336-D322CA85AF9C}" dt="2022-01-06T00:09:20.878" v="69" actId="20577"/>
+          <ac:chgData name="g.carbone8@campus.unimib.it" userId="b00d38c9-59ca-445d-a206-84026ffe8624" providerId="ADAL" clId="{73B03246-C0D6-48CE-B336-D322CA85AF9C}" dt="2022-01-06T00:21:55.287" v="80" actId="20577"/>
           <ac:spMkLst>
             <pc:docMk/>
             <pc:sldMk cId="3197017637" sldId="294"/>
+            <ac:spMk id="6" creationId="{D13A722D-E148-4971-82F3-1C191AFD95ED}"/>
+          </ac:spMkLst>
+        </pc:spChg>
+      </pc:sldChg>
+      <pc:sldChg chg="modSp mod">
+        <pc:chgData name="g.carbone8@campus.unimib.it" userId="b00d38c9-59ca-445d-a206-84026ffe8624" providerId="ADAL" clId="{73B03246-C0D6-48CE-B336-D322CA85AF9C}" dt="2022-01-06T00:27:29.056" v="107" actId="20577"/>
+        <pc:sldMkLst>
+          <pc:docMk/>
+          <pc:sldMk cId="2204845249" sldId="296"/>
+        </pc:sldMkLst>
+        <pc:spChg chg="mod">
+          <ac:chgData name="g.carbone8@campus.unimib.it" userId="b00d38c9-59ca-445d-a206-84026ffe8624" providerId="ADAL" clId="{73B03246-C0D6-48CE-B336-D322CA85AF9C}" dt="2022-01-06T00:27:29.056" v="107" actId="20577"/>
+          <ac:spMkLst>
+            <pc:docMk/>
+            <pc:sldMk cId="2204845249" sldId="296"/>
             <ac:spMk id="6" creationId="{D13A722D-E148-4971-82F3-1C191AFD95ED}"/>
           </ac:spMkLst>
         </pc:spChg>
@@ -7791,7 +7806,7 @@
                 <a:latin typeface="Poppins Light" panose="00000400000000000000" pitchFamily="50" charset="0"/>
                 <a:cs typeface="Poppins Light" panose="00000400000000000000" pitchFamily="50" charset="0"/>
               </a:rPr>
-              <a:t>Abilità sociali ed emozionali</a:t>
+              <a:t>Abilità sociali ed emotive</a:t>
             </a:r>
           </a:p>
           <a:p>
@@ -8088,7 +8103,7 @@
                 <a:latin typeface="Poppins Medium" panose="00000600000000000000" pitchFamily="2" charset="0"/>
                 <a:cs typeface="Poppins Medium" panose="00000600000000000000" pitchFamily="2" charset="0"/>
               </a:rPr>
-              <a:t>sistemi di educazione e formazione</a:t>
+              <a:t>sistemi educativi di istruzione e formazione</a:t>
             </a:r>
             <a:endParaRPr lang="it-IT" sz="1400" dirty="0">
               <a:latin typeface="Poppins Light" panose="00000400000000000000" pitchFamily="50" charset="0"/>
@@ -8111,25 +8126,11 @@
               <a:t>Sfruttare</a:t>
             </a:r>
             <a:r>
-              <a:rPr lang="en-US" sz="1400" dirty="0">
+              <a:rPr lang="en-US" sz="1400">
                 <a:latin typeface="Poppins Light" panose="00000400000000000000" pitchFamily="2" charset="0"/>
                 <a:cs typeface="Poppins Light" panose="00000400000000000000" pitchFamily="2" charset="0"/>
               </a:rPr>
               <a:t> le </a:t>
-            </a:r>
-            <a:r>
-              <a:rPr lang="en-US" sz="1400" dirty="0" err="1">
-                <a:latin typeface="Poppins Light" panose="00000400000000000000" pitchFamily="2" charset="0"/>
-                <a:cs typeface="Poppins Light" panose="00000400000000000000" pitchFamily="2" charset="0"/>
-              </a:rPr>
-              <a:t>le</a:t>
-            </a:r>
-            <a:r>
-              <a:rPr lang="en-US" sz="1400" dirty="0">
-                <a:latin typeface="Poppins Light" panose="00000400000000000000" pitchFamily="2" charset="0"/>
-                <a:cs typeface="Poppins Light" panose="00000400000000000000" pitchFamily="2" charset="0"/>
-              </a:rPr>
-              <a:t> </a:t>
             </a:r>
             <a:r>
               <a:rPr lang="en-US" sz="1400" dirty="0" err="1">

</xml_diff>